<commit_message>
Flow Diagram - Final
</commit_message>
<xml_diff>
--- a/Stuff/Flow diagram.pptx
+++ b/Stuff/Flow diagram.pptx
@@ -3015,8 +3015,8 @@
         </p:nvSpPr>
         <p:spPr>
           <a:xfrm>
-            <a:off x="4931167" y="282696"/>
-            <a:ext cx="1033188" cy="369332"/>
+            <a:off x="4481843" y="282696"/>
+            <a:ext cx="1854563" cy="369332"/>
           </a:xfrm>
           <a:prstGeom prst="rect">
             <a:avLst/>
@@ -3031,7 +3031,7 @@
           <a:p>
             <a:r>
               <a:rPr lang="en-US" dirty="0" smtClean="0"/>
-              <a:t>DATASET</a:t>
+              <a:t>HISTORICAL DATA</a:t>
             </a:r>
             <a:endParaRPr lang="en-US" dirty="0"/>
           </a:p>
@@ -3801,6 +3801,114 @@
             </a:r>
           </a:p>
           <a:p>
+            <a:endParaRPr lang="en-US" dirty="0"/>
+          </a:p>
+        </p:txBody>
+      </p:sp>
+      <p:sp>
+        <p:nvSpPr>
+          <p:cNvPr id="35" name="Rectangle 34"/>
+          <p:cNvSpPr/>
+          <p:nvPr/>
+        </p:nvSpPr>
+        <p:spPr>
+          <a:xfrm>
+            <a:off x="7527704" y="5594737"/>
+            <a:ext cx="2157219" cy="427984"/>
+          </a:xfrm>
+          <a:prstGeom prst="rect">
+            <a:avLst/>
+          </a:prstGeom>
+        </p:spPr>
+        <p:style>
+          <a:lnRef idx="2">
+            <a:schemeClr val="dk1"/>
+          </a:lnRef>
+          <a:fillRef idx="1">
+            <a:schemeClr val="lt1"/>
+          </a:fillRef>
+          <a:effectRef idx="0">
+            <a:schemeClr val="dk1"/>
+          </a:effectRef>
+          <a:fontRef idx="minor">
+            <a:schemeClr val="dk1"/>
+          </a:fontRef>
+        </p:style>
+        <p:txBody>
+          <a:bodyPr rtlCol="0" anchor="ctr"/>
+          <a:lstStyle/>
+          <a:p>
+            <a:pPr algn="ctr"/>
+            <a:endParaRPr lang="en-US"/>
+          </a:p>
+        </p:txBody>
+      </p:sp>
+      <p:cxnSp>
+        <p:nvCxnSpPr>
+          <p:cNvPr id="37" name="Straight Arrow Connector 36"/>
+          <p:cNvCxnSpPr>
+            <a:stCxn id="35" idx="1"/>
+            <a:endCxn id="70" idx="6"/>
+          </p:cNvCxnSpPr>
+          <p:nvPr/>
+        </p:nvCxnSpPr>
+        <p:spPr>
+          <a:xfrm flipH="1">
+            <a:off x="6631901" y="5808729"/>
+            <a:ext cx="895803" cy="1"/>
+          </a:xfrm>
+          <a:prstGeom prst="straightConnector1">
+            <a:avLst/>
+          </a:prstGeom>
+          <a:ln>
+            <a:tailEnd type="triangle"/>
+          </a:ln>
+        </p:spPr>
+        <p:style>
+          <a:lnRef idx="3">
+            <a:schemeClr val="dk1"/>
+          </a:lnRef>
+          <a:fillRef idx="0">
+            <a:schemeClr val="dk1"/>
+          </a:fillRef>
+          <a:effectRef idx="2">
+            <a:schemeClr val="dk1"/>
+          </a:effectRef>
+          <a:fontRef idx="minor">
+            <a:schemeClr val="tx1"/>
+          </a:fontRef>
+        </p:style>
+      </p:cxnSp>
+      <p:sp>
+        <p:nvSpPr>
+          <p:cNvPr id="38" name="TextBox 37"/>
+          <p:cNvSpPr txBox="1"/>
+          <p:nvPr/>
+        </p:nvSpPr>
+        <p:spPr>
+          <a:xfrm>
+            <a:off x="7830360" y="5639907"/>
+            <a:ext cx="1854563" cy="369332"/>
+          </a:xfrm>
+          <a:prstGeom prst="rect">
+            <a:avLst/>
+          </a:prstGeom>
+          <a:noFill/>
+        </p:spPr>
+        <p:txBody>
+          <a:bodyPr wrap="square" rtlCol="0">
+            <a:spAutoFit/>
+          </a:bodyPr>
+          <a:lstStyle/>
+          <a:p>
+            <a:r>
+              <a:rPr lang="en-US" dirty="0" smtClean="0"/>
+              <a:t>CURRENT</a:t>
+            </a:r>
+            <a:r>
+              <a:rPr lang="en-US" dirty="0" smtClean="0"/>
+              <a:t> DATA</a:t>
+            </a:r>
             <a:endParaRPr lang="en-US" dirty="0"/>
           </a:p>
         </p:txBody>

</xml_diff>